<commit_message>
Mudança antes do merge
</commit_message>
<xml_diff>
--- a/Documentacao/tcc_apresentacao.pptx
+++ b/Documentacao/tcc_apresentacao.pptx
@@ -1,12 +1,12 @@
 
 <file path=ppt/presentation.xml><?xml version="1.0" encoding="utf-8"?>
-<p:presentation xmlns:a="http://schemas.openxmlformats.org/drawingml/2006/main" xmlns:r="http://schemas.openxmlformats.org/officeDocument/2006/relationships" xmlns:p="http://schemas.openxmlformats.org/presentationml/2006/main" strictFirstAndLastChars="0" embedTrueTypeFonts="1" saveSubsetFonts="1" autoCompressPictures="0">
+<p:presentation xmlns:a="http://schemas.openxmlformats.org/drawingml/2006/main" xmlns:r="http://schemas.openxmlformats.org/officeDocument/2006/relationships" xmlns:p="http://schemas.openxmlformats.org/presentationml/2006/main" showSpecialPlsOnTitleSld="0" strictFirstAndLastChars="0" embedTrueTypeFonts="1" saveSubsetFonts="1" autoCompressPictures="0">
   <p:sldMasterIdLst>
     <p:sldMasterId id="2147483670" r:id="rId1"/>
     <p:sldMasterId id="2147483671" r:id="rId2"/>
   </p:sldMasterIdLst>
   <p:notesMasterIdLst>
-    <p:notesMasterId r:id="rId13"/>
+    <p:notesMasterId r:id="rId15"/>
   </p:notesMasterIdLst>
   <p:sldIdLst>
     <p:sldId id="256" r:id="rId3"/>
@@ -17,29 +17,31 @@
     <p:sldId id="285" r:id="rId8"/>
     <p:sldId id="276" r:id="rId9"/>
     <p:sldId id="280" r:id="rId10"/>
-    <p:sldId id="281" r:id="rId11"/>
-    <p:sldId id="282" r:id="rId12"/>
+    <p:sldId id="286" r:id="rId11"/>
+    <p:sldId id="287" r:id="rId12"/>
+    <p:sldId id="281" r:id="rId13"/>
+    <p:sldId id="282" r:id="rId14"/>
   </p:sldIdLst>
   <p:sldSz cx="9144000" cy="5143500" type="screen16x9"/>
   <p:notesSz cx="6858000" cy="9144000"/>
   <p:embeddedFontLst>
     <p:embeddedFont>
       <p:font typeface="Franklin Gothic" panose="020B0604020202020204" charset="0"/>
-      <p:bold r:id="rId14"/>
+      <p:bold r:id="rId16"/>
+    </p:embeddedFont>
+    <p:embeddedFont>
+      <p:font typeface="Libre Franklin" panose="020B0604020202020204" charset="0"/>
+      <p:regular r:id="rId17"/>
+      <p:bold r:id="rId18"/>
+      <p:italic r:id="rId19"/>
+      <p:boldItalic r:id="rId20"/>
     </p:embeddedFont>
     <p:embeddedFont>
       <p:font typeface="Calibri" panose="020F0502020204030204" pitchFamily="34" charset="0"/>
-      <p:regular r:id="rId15"/>
-      <p:bold r:id="rId16"/>
-      <p:italic r:id="rId17"/>
-      <p:boldItalic r:id="rId18"/>
-    </p:embeddedFont>
-    <p:embeddedFont>
-      <p:font typeface="Libre Franklin" panose="020B0604020202020204" charset="0"/>
-      <p:regular r:id="rId19"/>
-      <p:bold r:id="rId20"/>
-      <p:italic r:id="rId21"/>
-      <p:boldItalic r:id="rId22"/>
+      <p:regular r:id="rId21"/>
+      <p:bold r:id="rId22"/>
+      <p:italic r:id="rId23"/>
+      <p:boldItalic r:id="rId24"/>
     </p:embeddedFont>
   </p:embeddedFontLst>
   <p:defaultTextStyle>
@@ -1256,6 +1258,224 @@
   <p:cSld>
     <p:spTree>
       <p:nvGrpSpPr>
+        <p:cNvPr id="1" name="Shape 339"/>
+        <p:cNvGrpSpPr/>
+        <p:nvPr/>
+      </p:nvGrpSpPr>
+      <p:grpSpPr>
+        <a:xfrm>
+          <a:off x="0" y="0"/>
+          <a:ext cx="0" cy="0"/>
+          <a:chOff x="0" y="0"/>
+          <a:chExt cx="0" cy="0"/>
+        </a:xfrm>
+      </p:grpSpPr>
+      <p:sp>
+        <p:nvSpPr>
+          <p:cNvPr id="340" name="Google Shape;340;g9027aba542_0_10:notes"/>
+          <p:cNvSpPr txBox="1">
+            <a:spLocks noGrp="1"/>
+          </p:cNvSpPr>
+          <p:nvPr>
+            <p:ph type="body" idx="1"/>
+          </p:nvPr>
+        </p:nvSpPr>
+        <p:spPr>
+          <a:xfrm>
+            <a:off x="685800" y="4343400"/>
+            <a:ext cx="5486400" cy="4114800"/>
+          </a:xfrm>
+          <a:prstGeom prst="rect">
+            <a:avLst/>
+          </a:prstGeom>
+        </p:spPr>
+        <p:txBody>
+          <a:bodyPr spcFirstLastPara="1" wrap="square" lIns="91425" tIns="91425" rIns="91425" bIns="91425" anchor="t" anchorCtr="0">
+            <a:noAutofit/>
+          </a:bodyPr>
+          <a:lstStyle/>
+          <a:p>
+            <a:pPr marL="0" lvl="0" indent="0" algn="l" rtl="0">
+              <a:spcBef>
+                <a:spcPts val="0"/>
+              </a:spcBef>
+              <a:spcAft>
+                <a:spcPts val="0"/>
+              </a:spcAft>
+              <a:buNone/>
+            </a:pPr>
+            <a:endParaRPr/>
+          </a:p>
+        </p:txBody>
+      </p:sp>
+      <p:sp>
+        <p:nvSpPr>
+          <p:cNvPr id="341" name="Google Shape;341;g9027aba542_0_10:notes"/>
+          <p:cNvSpPr>
+            <a:spLocks noGrp="1" noRot="1" noChangeAspect="1"/>
+          </p:cNvSpPr>
+          <p:nvPr>
+            <p:ph type="sldImg" idx="2"/>
+          </p:nvPr>
+        </p:nvSpPr>
+        <p:spPr>
+          <a:xfrm>
+            <a:off x="381000" y="685800"/>
+            <a:ext cx="6096000" cy="3429000"/>
+          </a:xfrm>
+          <a:custGeom>
+            <a:avLst/>
+            <a:gdLst/>
+            <a:ahLst/>
+            <a:cxnLst/>
+            <a:rect l="l" t="t" r="r" b="b"/>
+            <a:pathLst>
+              <a:path w="120000" h="120000" extrusionOk="0">
+                <a:moveTo>
+                  <a:pt x="0" y="0"/>
+                </a:moveTo>
+                <a:lnTo>
+                  <a:pt x="120000" y="0"/>
+                </a:lnTo>
+                <a:lnTo>
+                  <a:pt x="120000" y="120000"/>
+                </a:lnTo>
+                <a:lnTo>
+                  <a:pt x="0" y="120000"/>
+                </a:lnTo>
+                <a:close/>
+              </a:path>
+            </a:pathLst>
+          </a:custGeom>
+        </p:spPr>
+      </p:sp>
+    </p:spTree>
+    <p:extLst>
+      <p:ext uri="{BB962C8B-B14F-4D97-AF65-F5344CB8AC3E}">
+        <p14:creationId xmlns:p14="http://schemas.microsoft.com/office/powerpoint/2010/main" val="1300658370"/>
+      </p:ext>
+    </p:extLst>
+  </p:cSld>
+  <p:clrMapOvr>
+    <a:masterClrMapping/>
+  </p:clrMapOvr>
+</p:notes>
+</file>
+
+<file path=ppt/notesSlides/notesSlide7.xml><?xml version="1.0" encoding="utf-8"?>
+<p:notes xmlns:a="http://schemas.openxmlformats.org/drawingml/2006/main" xmlns:r="http://schemas.openxmlformats.org/officeDocument/2006/relationships" xmlns:p="http://schemas.openxmlformats.org/presentationml/2006/main" showMasterSp="0" showMasterPhAnim="0">
+  <p:cSld>
+    <p:spTree>
+      <p:nvGrpSpPr>
+        <p:cNvPr id="1" name="Shape 339"/>
+        <p:cNvGrpSpPr/>
+        <p:nvPr/>
+      </p:nvGrpSpPr>
+      <p:grpSpPr>
+        <a:xfrm>
+          <a:off x="0" y="0"/>
+          <a:ext cx="0" cy="0"/>
+          <a:chOff x="0" y="0"/>
+          <a:chExt cx="0" cy="0"/>
+        </a:xfrm>
+      </p:grpSpPr>
+      <p:sp>
+        <p:nvSpPr>
+          <p:cNvPr id="340" name="Google Shape;340;g9027aba542_0_10:notes"/>
+          <p:cNvSpPr txBox="1">
+            <a:spLocks noGrp="1"/>
+          </p:cNvSpPr>
+          <p:nvPr>
+            <p:ph type="body" idx="1"/>
+          </p:nvPr>
+        </p:nvSpPr>
+        <p:spPr>
+          <a:xfrm>
+            <a:off x="685800" y="4343400"/>
+            <a:ext cx="5486400" cy="4114800"/>
+          </a:xfrm>
+          <a:prstGeom prst="rect">
+            <a:avLst/>
+          </a:prstGeom>
+        </p:spPr>
+        <p:txBody>
+          <a:bodyPr spcFirstLastPara="1" wrap="square" lIns="91425" tIns="91425" rIns="91425" bIns="91425" anchor="t" anchorCtr="0">
+            <a:noAutofit/>
+          </a:bodyPr>
+          <a:lstStyle/>
+          <a:p>
+            <a:pPr marL="0" lvl="0" indent="0" algn="l" rtl="0">
+              <a:spcBef>
+                <a:spcPts val="0"/>
+              </a:spcBef>
+              <a:spcAft>
+                <a:spcPts val="0"/>
+              </a:spcAft>
+              <a:buNone/>
+            </a:pPr>
+            <a:endParaRPr/>
+          </a:p>
+        </p:txBody>
+      </p:sp>
+      <p:sp>
+        <p:nvSpPr>
+          <p:cNvPr id="341" name="Google Shape;341;g9027aba542_0_10:notes"/>
+          <p:cNvSpPr>
+            <a:spLocks noGrp="1" noRot="1" noChangeAspect="1"/>
+          </p:cNvSpPr>
+          <p:nvPr>
+            <p:ph type="sldImg" idx="2"/>
+          </p:nvPr>
+        </p:nvSpPr>
+        <p:spPr>
+          <a:xfrm>
+            <a:off x="381000" y="685800"/>
+            <a:ext cx="6096000" cy="3429000"/>
+          </a:xfrm>
+          <a:custGeom>
+            <a:avLst/>
+            <a:gdLst/>
+            <a:ahLst/>
+            <a:cxnLst/>
+            <a:rect l="l" t="t" r="r" b="b"/>
+            <a:pathLst>
+              <a:path w="120000" h="120000" extrusionOk="0">
+                <a:moveTo>
+                  <a:pt x="0" y="0"/>
+                </a:moveTo>
+                <a:lnTo>
+                  <a:pt x="120000" y="0"/>
+                </a:lnTo>
+                <a:lnTo>
+                  <a:pt x="120000" y="120000"/>
+                </a:lnTo>
+                <a:lnTo>
+                  <a:pt x="0" y="120000"/>
+                </a:lnTo>
+                <a:close/>
+              </a:path>
+            </a:pathLst>
+          </a:custGeom>
+        </p:spPr>
+      </p:sp>
+    </p:spTree>
+    <p:extLst>
+      <p:ext uri="{BB962C8B-B14F-4D97-AF65-F5344CB8AC3E}">
+        <p14:creationId xmlns:p14="http://schemas.microsoft.com/office/powerpoint/2010/main" val="1734380032"/>
+      </p:ext>
+    </p:extLst>
+  </p:cSld>
+  <p:clrMapOvr>
+    <a:masterClrMapping/>
+  </p:clrMapOvr>
+</p:notes>
+</file>
+
+<file path=ppt/notesSlides/notesSlide8.xml><?xml version="1.0" encoding="utf-8"?>
+<p:notes xmlns:a="http://schemas.openxmlformats.org/drawingml/2006/main" xmlns:r="http://schemas.openxmlformats.org/officeDocument/2006/relationships" xmlns:p="http://schemas.openxmlformats.org/presentationml/2006/main" showMasterSp="0" showMasterPhAnim="0">
+  <p:cSld>
+    <p:spTree>
+      <p:nvGrpSpPr>
         <p:cNvPr id="1" name="Shape 345"/>
         <p:cNvGrpSpPr/>
         <p:nvPr/>
@@ -1355,7 +1575,7 @@
 </p:notes>
 </file>
 
-<file path=ppt/notesSlides/notesSlide7.xml><?xml version="1.0" encoding="utf-8"?>
+<file path=ppt/notesSlides/notesSlide9.xml><?xml version="1.0" encoding="utf-8"?>
 <p:notes xmlns:a="http://schemas.openxmlformats.org/drawingml/2006/main" xmlns:r="http://schemas.openxmlformats.org/officeDocument/2006/relationships" xmlns:p="http://schemas.openxmlformats.org/presentationml/2006/main" showMasterSp="0" showMasterPhAnim="0">
   <p:cSld>
     <p:spTree>
@@ -15295,7 +15515,7 @@
     <p:sldLayoutId id="2147483657" r:id="rId10"/>
     <p:sldLayoutId id="2147483658" r:id="rId11"/>
   </p:sldLayoutIdLst>
-  <p:hf sldNum="0" hdr="0" ftr="0" dt="0"/>
+  <p:hf hdr="0" ftr="0" dt="0"/>
   <p:txStyles>
     <p:titleStyle>
       <a:defPPr marR="0" lvl="0" algn="l" rtl="0">
@@ -17042,7 +17262,7 @@
     <p:sldLayoutId id="2147483668" r:id="rId10"/>
     <p:sldLayoutId id="2147483669" r:id="rId11"/>
   </p:sldLayoutIdLst>
-  <p:hf sldNum="0" hdr="0" ftr="0" dt="0"/>
+  <p:hf hdr="0" ftr="0" dt="0"/>
   <p:txStyles>
     <p:titleStyle>
       <a:defPPr marR="0" lvl="0" algn="l" rtl="0">
@@ -17907,6 +18127,282 @@
   <p:cSld>
     <p:spTree>
       <p:nvGrpSpPr>
+        <p:cNvPr id="1" name="Shape 342"/>
+        <p:cNvGrpSpPr/>
+        <p:nvPr/>
+      </p:nvGrpSpPr>
+      <p:grpSpPr>
+        <a:xfrm>
+          <a:off x="0" y="0"/>
+          <a:ext cx="0" cy="0"/>
+          <a:chOff x="0" y="0"/>
+          <a:chExt cx="0" cy="0"/>
+        </a:xfrm>
+      </p:grpSpPr>
+      <p:sp>
+        <p:nvSpPr>
+          <p:cNvPr id="343" name="Google Shape;343;p49"/>
+          <p:cNvSpPr txBox="1">
+            <a:spLocks noGrp="1"/>
+          </p:cNvSpPr>
+          <p:nvPr>
+            <p:ph type="title"/>
+          </p:nvPr>
+        </p:nvSpPr>
+        <p:spPr>
+          <a:xfrm>
+            <a:off x="628650" y="273844"/>
+            <a:ext cx="7886700" cy="994200"/>
+          </a:xfrm>
+          <a:prstGeom prst="rect">
+            <a:avLst/>
+          </a:prstGeom>
+          <a:noFill/>
+          <a:ln>
+            <a:noFill/>
+          </a:ln>
+        </p:spPr>
+        <p:txBody>
+          <a:bodyPr spcFirstLastPara="1" wrap="square" lIns="91425" tIns="45700" rIns="91425" bIns="45700" anchor="ctr" anchorCtr="0">
+            <a:noAutofit/>
+          </a:bodyPr>
+          <a:lstStyle/>
+          <a:p>
+            <a:pPr marL="0" lvl="0" indent="0" algn="l" rtl="0">
+              <a:lnSpc>
+                <a:spcPct val="90000"/>
+              </a:lnSpc>
+              <a:spcBef>
+                <a:spcPts val="0"/>
+              </a:spcBef>
+              <a:spcAft>
+                <a:spcPts val="0"/>
+              </a:spcAft>
+              <a:buClr>
+                <a:srgbClr val="00B050"/>
+              </a:buClr>
+              <a:buSzPts val="4400"/>
+              <a:buFont typeface="Franklin Gothic"/>
+              <a:buNone/>
+            </a:pPr>
+            <a:r>
+              <a:rPr lang="en"/>
+              <a:t>Resultados</a:t>
+            </a:r>
+            <a:endParaRPr/>
+          </a:p>
+        </p:txBody>
+      </p:sp>
+      <p:sp>
+        <p:nvSpPr>
+          <p:cNvPr id="2" name="Espaço Reservado para Número de Slide 1"/>
+          <p:cNvSpPr>
+            <a:spLocks noGrp="1"/>
+          </p:cNvSpPr>
+          <p:nvPr>
+            <p:ph type="sldNum" idx="12"/>
+          </p:nvPr>
+        </p:nvSpPr>
+        <p:spPr/>
+        <p:txBody>
+          <a:bodyPr/>
+          <a:lstStyle/>
+          <a:p>
+            <a:pPr marL="0" lvl="0" indent="0" algn="r" rtl="0">
+              <a:spcBef>
+                <a:spcPts val="0"/>
+              </a:spcBef>
+              <a:spcAft>
+                <a:spcPts val="0"/>
+              </a:spcAft>
+              <a:buNone/>
+            </a:pPr>
+            <a:fld id="{00000000-1234-1234-1234-123412341234}" type="slidenum">
+              <a:rPr lang="pt-BR" smtClean="0"/>
+              <a:t>10</a:t>
+            </a:fld>
+            <a:endParaRPr lang="pt-BR"/>
+          </a:p>
+        </p:txBody>
+      </p:sp>
+    </p:spTree>
+    <p:extLst>
+      <p:ext uri="{BB962C8B-B14F-4D97-AF65-F5344CB8AC3E}">
+        <p14:creationId xmlns:p14="http://schemas.microsoft.com/office/powerpoint/2010/main" val="163574631"/>
+      </p:ext>
+    </p:extLst>
+  </p:cSld>
+  <p:clrMapOvr>
+    <a:masterClrMapping/>
+  </p:clrMapOvr>
+</p:sld>
+</file>
+
+<file path=ppt/slides/slide11.xml><?xml version="1.0" encoding="utf-8"?>
+<p:sld xmlns:a="http://schemas.openxmlformats.org/drawingml/2006/main" xmlns:r="http://schemas.openxmlformats.org/officeDocument/2006/relationships" xmlns:p="http://schemas.openxmlformats.org/presentationml/2006/main">
+  <p:cSld>
+    <p:spTree>
+      <p:nvGrpSpPr>
+        <p:cNvPr id="1" name="Shape 348"/>
+        <p:cNvGrpSpPr/>
+        <p:nvPr/>
+      </p:nvGrpSpPr>
+      <p:grpSpPr>
+        <a:xfrm>
+          <a:off x="0" y="0"/>
+          <a:ext cx="0" cy="0"/>
+          <a:chOff x="0" y="0"/>
+          <a:chExt cx="0" cy="0"/>
+        </a:xfrm>
+      </p:grpSpPr>
+      <p:sp>
+        <p:nvSpPr>
+          <p:cNvPr id="349" name="Google Shape;349;p50"/>
+          <p:cNvSpPr txBox="1">
+            <a:spLocks noGrp="1"/>
+          </p:cNvSpPr>
+          <p:nvPr>
+            <p:ph type="title"/>
+          </p:nvPr>
+        </p:nvSpPr>
+        <p:spPr>
+          <a:xfrm>
+            <a:off x="628650" y="273844"/>
+            <a:ext cx="7886700" cy="994200"/>
+          </a:xfrm>
+          <a:prstGeom prst="rect">
+            <a:avLst/>
+          </a:prstGeom>
+          <a:noFill/>
+          <a:ln>
+            <a:noFill/>
+          </a:ln>
+        </p:spPr>
+        <p:txBody>
+          <a:bodyPr spcFirstLastPara="1" wrap="square" lIns="91425" tIns="45700" rIns="91425" bIns="45700" anchor="ctr" anchorCtr="0">
+            <a:noAutofit/>
+          </a:bodyPr>
+          <a:lstStyle/>
+          <a:p>
+            <a:pPr marL="0" lvl="0" indent="0" algn="l" rtl="0">
+              <a:lnSpc>
+                <a:spcPct val="90000"/>
+              </a:lnSpc>
+              <a:spcBef>
+                <a:spcPts val="0"/>
+              </a:spcBef>
+              <a:spcAft>
+                <a:spcPts val="0"/>
+              </a:spcAft>
+              <a:buClr>
+                <a:srgbClr val="00B050"/>
+              </a:buClr>
+              <a:buSzPts val="4400"/>
+              <a:buFont typeface="Franklin Gothic"/>
+              <a:buNone/>
+            </a:pPr>
+            <a:r>
+              <a:rPr lang="en"/>
+              <a:t>Conclusão</a:t>
+            </a:r>
+            <a:endParaRPr/>
+          </a:p>
+        </p:txBody>
+      </p:sp>
+      <p:sp>
+        <p:nvSpPr>
+          <p:cNvPr id="350" name="Google Shape;350;p50"/>
+          <p:cNvSpPr txBox="1">
+            <a:spLocks noGrp="1"/>
+          </p:cNvSpPr>
+          <p:nvPr>
+            <p:ph type="body" idx="1"/>
+          </p:nvPr>
+        </p:nvSpPr>
+        <p:spPr>
+          <a:xfrm>
+            <a:off x="628650" y="1369219"/>
+            <a:ext cx="7886700" cy="3263400"/>
+          </a:xfrm>
+          <a:prstGeom prst="rect">
+            <a:avLst/>
+          </a:prstGeom>
+          <a:noFill/>
+          <a:ln>
+            <a:noFill/>
+          </a:ln>
+        </p:spPr>
+        <p:txBody>
+          <a:bodyPr spcFirstLastPara="1" wrap="square" lIns="91425" tIns="45700" rIns="91425" bIns="45700" anchor="t" anchorCtr="0">
+            <a:noAutofit/>
+          </a:bodyPr>
+          <a:lstStyle/>
+          <a:p>
+            <a:pPr marL="228600" lvl="0" indent="-50800" algn="l" rtl="0">
+              <a:lnSpc>
+                <a:spcPct val="90000"/>
+              </a:lnSpc>
+              <a:spcBef>
+                <a:spcPts val="0"/>
+              </a:spcBef>
+              <a:spcAft>
+                <a:spcPts val="0"/>
+              </a:spcAft>
+              <a:buClr>
+                <a:srgbClr val="3F3F3F"/>
+              </a:buClr>
+              <a:buSzPts val="2800"/>
+              <a:buNone/>
+            </a:pPr>
+            <a:endParaRPr/>
+          </a:p>
+        </p:txBody>
+      </p:sp>
+      <p:sp>
+        <p:nvSpPr>
+          <p:cNvPr id="2" name="Espaço Reservado para Número de Slide 1"/>
+          <p:cNvSpPr>
+            <a:spLocks noGrp="1"/>
+          </p:cNvSpPr>
+          <p:nvPr>
+            <p:ph type="sldNum" idx="12"/>
+          </p:nvPr>
+        </p:nvSpPr>
+        <p:spPr/>
+        <p:txBody>
+          <a:bodyPr/>
+          <a:lstStyle/>
+          <a:p>
+            <a:pPr marL="0" lvl="0" indent="0" algn="r" rtl="0">
+              <a:spcBef>
+                <a:spcPts val="0"/>
+              </a:spcBef>
+              <a:spcAft>
+                <a:spcPts val="0"/>
+              </a:spcAft>
+              <a:buNone/>
+            </a:pPr>
+            <a:fld id="{00000000-1234-1234-1234-123412341234}" type="slidenum">
+              <a:rPr lang="pt-BR" smtClean="0"/>
+              <a:t>11</a:t>
+            </a:fld>
+            <a:endParaRPr lang="pt-BR"/>
+          </a:p>
+        </p:txBody>
+      </p:sp>
+    </p:spTree>
+  </p:cSld>
+  <p:clrMapOvr>
+    <a:masterClrMapping/>
+  </p:clrMapOvr>
+</p:sld>
+</file>
+
+<file path=ppt/slides/slide12.xml><?xml version="1.0" encoding="utf-8"?>
+<p:sld xmlns:a="http://schemas.openxmlformats.org/drawingml/2006/main" xmlns:r="http://schemas.openxmlformats.org/officeDocument/2006/relationships" xmlns:p="http://schemas.openxmlformats.org/presentationml/2006/main">
+  <p:cSld>
+    <p:spTree>
+      <p:nvGrpSpPr>
         <p:cNvPr id="1" name="Shape 354"/>
         <p:cNvGrpSpPr/>
         <p:nvPr/>
@@ -18015,6 +18511,38 @@
               <a:buNone/>
             </a:pPr>
             <a:endParaRPr sz="1100" dirty="0"/>
+          </a:p>
+        </p:txBody>
+      </p:sp>
+      <p:sp>
+        <p:nvSpPr>
+          <p:cNvPr id="2" name="Espaço Reservado para Número de Slide 1"/>
+          <p:cNvSpPr>
+            <a:spLocks noGrp="1"/>
+          </p:cNvSpPr>
+          <p:nvPr>
+            <p:ph type="sldNum" idx="12"/>
+          </p:nvPr>
+        </p:nvSpPr>
+        <p:spPr/>
+        <p:txBody>
+          <a:bodyPr/>
+          <a:lstStyle/>
+          <a:p>
+            <a:pPr marL="0" lvl="0" indent="0" algn="r" rtl="0">
+              <a:spcBef>
+                <a:spcPts val="0"/>
+              </a:spcBef>
+              <a:spcAft>
+                <a:spcPts val="0"/>
+              </a:spcAft>
+              <a:buNone/>
+            </a:pPr>
+            <a:fld id="{00000000-1234-1234-1234-123412341234}" type="slidenum">
+              <a:rPr lang="pt-BR" smtClean="0"/>
+              <a:t>12</a:t>
+            </a:fld>
+            <a:endParaRPr lang="pt-BR"/>
           </a:p>
         </p:txBody>
       </p:sp>
@@ -18269,6 +18797,38 @@
           </a:p>
         </p:txBody>
       </p:sp>
+      <p:sp>
+        <p:nvSpPr>
+          <p:cNvPr id="2" name="Espaço Reservado para Número de Slide 1"/>
+          <p:cNvSpPr>
+            <a:spLocks noGrp="1"/>
+          </p:cNvSpPr>
+          <p:nvPr>
+            <p:ph type="sldNum" idx="12"/>
+          </p:nvPr>
+        </p:nvSpPr>
+        <p:spPr/>
+        <p:txBody>
+          <a:bodyPr/>
+          <a:lstStyle/>
+          <a:p>
+            <a:pPr marL="0" lvl="0" indent="0" algn="r" rtl="0">
+              <a:spcBef>
+                <a:spcPts val="0"/>
+              </a:spcBef>
+              <a:spcAft>
+                <a:spcPts val="0"/>
+              </a:spcAft>
+              <a:buNone/>
+            </a:pPr>
+            <a:fld id="{00000000-1234-1234-1234-123412341234}" type="slidenum">
+              <a:rPr lang="pt-BR" smtClean="0"/>
+              <a:t>2</a:t>
+            </a:fld>
+            <a:endParaRPr lang="pt-BR"/>
+          </a:p>
+        </p:txBody>
+      </p:sp>
     </p:spTree>
   </p:cSld>
   <p:clrMapOvr>
@@ -18451,6 +19011,38 @@
               <a:t>Processamento Digital de imagens é a forma computacional de realizar procedimentos onde a entrada é uma imagem e a saída é uma nova imagem que pode ter diversas modificações diferentes, podendo ser algumas delas: realce do brilho, redimensionar a imagem, destacar objetos, etc.</a:t>
             </a:r>
             <a:endParaRPr sz="2400" dirty="0"/>
+          </a:p>
+        </p:txBody>
+      </p:sp>
+      <p:sp>
+        <p:nvSpPr>
+          <p:cNvPr id="2" name="Espaço Reservado para Número de Slide 1"/>
+          <p:cNvSpPr>
+            <a:spLocks noGrp="1"/>
+          </p:cNvSpPr>
+          <p:nvPr>
+            <p:ph type="sldNum" idx="12"/>
+          </p:nvPr>
+        </p:nvSpPr>
+        <p:spPr/>
+        <p:txBody>
+          <a:bodyPr/>
+          <a:lstStyle/>
+          <a:p>
+            <a:pPr marL="0" lvl="0" indent="0" algn="r" rtl="0">
+              <a:spcBef>
+                <a:spcPts val="0"/>
+              </a:spcBef>
+              <a:spcAft>
+                <a:spcPts val="0"/>
+              </a:spcAft>
+              <a:buNone/>
+            </a:pPr>
+            <a:fld id="{00000000-1234-1234-1234-123412341234}" type="slidenum">
+              <a:rPr lang="pt-BR" smtClean="0"/>
+              <a:t>3</a:t>
+            </a:fld>
+            <a:endParaRPr lang="pt-BR"/>
           </a:p>
         </p:txBody>
       </p:sp>
@@ -18538,6 +19130,38 @@
               <a:rPr lang="pt-BR" dirty="0"/>
               <a:t>	</a:t>
             </a:r>
+          </a:p>
+        </p:txBody>
+      </p:sp>
+      <p:sp>
+        <p:nvSpPr>
+          <p:cNvPr id="4" name="Espaço Reservado para Número de Slide 3"/>
+          <p:cNvSpPr>
+            <a:spLocks noGrp="1"/>
+          </p:cNvSpPr>
+          <p:nvPr>
+            <p:ph type="sldNum" idx="12"/>
+          </p:nvPr>
+        </p:nvSpPr>
+        <p:spPr/>
+        <p:txBody>
+          <a:bodyPr/>
+          <a:lstStyle/>
+          <a:p>
+            <a:pPr marL="0" lvl="0" indent="0" algn="r" rtl="0">
+              <a:spcBef>
+                <a:spcPts val="0"/>
+              </a:spcBef>
+              <a:spcAft>
+                <a:spcPts val="0"/>
+              </a:spcAft>
+              <a:buNone/>
+            </a:pPr>
+            <a:fld id="{00000000-1234-1234-1234-123412341234}" type="slidenum">
+              <a:rPr lang="pt-BR" smtClean="0"/>
+              <a:t>4</a:t>
+            </a:fld>
+            <a:endParaRPr lang="pt-BR"/>
           </a:p>
         </p:txBody>
       </p:sp>
@@ -18620,6 +19244,38 @@
           </a:p>
         </p:txBody>
       </p:sp>
+      <p:sp>
+        <p:nvSpPr>
+          <p:cNvPr id="4" name="Espaço Reservado para Número de Slide 3"/>
+          <p:cNvSpPr>
+            <a:spLocks noGrp="1"/>
+          </p:cNvSpPr>
+          <p:nvPr>
+            <p:ph type="sldNum" idx="12"/>
+          </p:nvPr>
+        </p:nvSpPr>
+        <p:spPr/>
+        <p:txBody>
+          <a:bodyPr/>
+          <a:lstStyle/>
+          <a:p>
+            <a:pPr marL="0" lvl="0" indent="0" algn="r" rtl="0">
+              <a:spcBef>
+                <a:spcPts val="0"/>
+              </a:spcBef>
+              <a:spcAft>
+                <a:spcPts val="0"/>
+              </a:spcAft>
+              <a:buNone/>
+            </a:pPr>
+            <a:fld id="{00000000-1234-1234-1234-123412341234}" type="slidenum">
+              <a:rPr lang="pt-BR" smtClean="0"/>
+              <a:t>5</a:t>
+            </a:fld>
+            <a:endParaRPr lang="pt-BR"/>
+          </a:p>
+        </p:txBody>
+      </p:sp>
     </p:spTree>
     <p:extLst>
       <p:ext uri="{BB962C8B-B14F-4D97-AF65-F5344CB8AC3E}">
@@ -18699,6 +19355,38 @@
           </a:p>
         </p:txBody>
       </p:sp>
+      <p:sp>
+        <p:nvSpPr>
+          <p:cNvPr id="4" name="Espaço Reservado para Número de Slide 3"/>
+          <p:cNvSpPr>
+            <a:spLocks noGrp="1"/>
+          </p:cNvSpPr>
+          <p:nvPr>
+            <p:ph type="sldNum" idx="12"/>
+          </p:nvPr>
+        </p:nvSpPr>
+        <p:spPr/>
+        <p:txBody>
+          <a:bodyPr/>
+          <a:lstStyle/>
+          <a:p>
+            <a:pPr marL="0" lvl="0" indent="0" algn="r" rtl="0">
+              <a:spcBef>
+                <a:spcPts val="0"/>
+              </a:spcBef>
+              <a:spcAft>
+                <a:spcPts val="0"/>
+              </a:spcAft>
+              <a:buNone/>
+            </a:pPr>
+            <a:fld id="{00000000-1234-1234-1234-123412341234}" type="slidenum">
+              <a:rPr lang="pt-BR" smtClean="0"/>
+              <a:t>6</a:t>
+            </a:fld>
+            <a:endParaRPr lang="pt-BR"/>
+          </a:p>
+        </p:txBody>
+      </p:sp>
     </p:spTree>
     <p:extLst>
       <p:ext uri="{BB962C8B-B14F-4D97-AF65-F5344CB8AC3E}">
@@ -18972,6 +19660,38 @@
           </a:p>
         </p:txBody>
       </p:sp>
+      <p:sp>
+        <p:nvSpPr>
+          <p:cNvPr id="2" name="Espaço Reservado para Número de Slide 1"/>
+          <p:cNvSpPr>
+            <a:spLocks noGrp="1"/>
+          </p:cNvSpPr>
+          <p:nvPr>
+            <p:ph type="sldNum" idx="12"/>
+          </p:nvPr>
+        </p:nvSpPr>
+        <p:spPr/>
+        <p:txBody>
+          <a:bodyPr/>
+          <a:lstStyle/>
+          <a:p>
+            <a:pPr marL="0" lvl="0" indent="0" algn="r" rtl="0">
+              <a:spcBef>
+                <a:spcPts val="0"/>
+              </a:spcBef>
+              <a:spcAft>
+                <a:spcPts val="0"/>
+              </a:spcAft>
+              <a:buNone/>
+            </a:pPr>
+            <a:fld id="{00000000-1234-1234-1234-123412341234}" type="slidenum">
+              <a:rPr lang="pt-BR" smtClean="0"/>
+              <a:t>7</a:t>
+            </a:fld>
+            <a:endParaRPr lang="pt-BR"/>
+          </a:p>
+        </p:txBody>
+      </p:sp>
     </p:spTree>
   </p:cSld>
   <p:clrMapOvr>
@@ -19051,6 +19771,38 @@
           </a:p>
         </p:txBody>
       </p:sp>
+      <p:sp>
+        <p:nvSpPr>
+          <p:cNvPr id="2" name="Espaço Reservado para Número de Slide 1"/>
+          <p:cNvSpPr>
+            <a:spLocks noGrp="1"/>
+          </p:cNvSpPr>
+          <p:nvPr>
+            <p:ph type="sldNum" idx="12"/>
+          </p:nvPr>
+        </p:nvSpPr>
+        <p:spPr/>
+        <p:txBody>
+          <a:bodyPr/>
+          <a:lstStyle/>
+          <a:p>
+            <a:pPr marL="0" lvl="0" indent="0" algn="r" rtl="0">
+              <a:spcBef>
+                <a:spcPts val="0"/>
+              </a:spcBef>
+              <a:spcAft>
+                <a:spcPts val="0"/>
+              </a:spcAft>
+              <a:buNone/>
+            </a:pPr>
+            <a:fld id="{00000000-1234-1234-1234-123412341234}" type="slidenum">
+              <a:rPr lang="pt-BR" smtClean="0"/>
+              <a:t>8</a:t>
+            </a:fld>
+            <a:endParaRPr lang="pt-BR"/>
+          </a:p>
+        </p:txBody>
+      </p:sp>
     </p:spTree>
   </p:cSld>
   <p:clrMapOvr>
@@ -19064,7 +19816,7 @@
   <p:cSld>
     <p:spTree>
       <p:nvGrpSpPr>
-        <p:cNvPr id="1" name="Shape 348"/>
+        <p:cNvPr id="1" name="Shape 342"/>
         <p:cNvGrpSpPr/>
         <p:nvPr/>
       </p:nvGrpSpPr>
@@ -19078,7 +19830,7 @@
       </p:grpSpPr>
       <p:sp>
         <p:nvSpPr>
-          <p:cNvPr id="349" name="Google Shape;349;p50"/>
+          <p:cNvPr id="343" name="Google Shape;343;p49"/>
           <p:cNvSpPr txBox="1">
             <a:spLocks noGrp="1"/>
           </p:cNvSpPr>
@@ -19124,7 +19876,7 @@
             </a:pPr>
             <a:r>
               <a:rPr lang="en"/>
-              <a:t>Conclusão</a:t>
+              <a:t>Resultados</a:t>
             </a:r>
             <a:endParaRPr/>
           </a:p>
@@ -19132,54 +19884,42 @@
       </p:sp>
       <p:sp>
         <p:nvSpPr>
-          <p:cNvPr id="350" name="Google Shape;350;p50"/>
-          <p:cNvSpPr txBox="1">
+          <p:cNvPr id="2" name="Espaço Reservado para Número de Slide 1"/>
+          <p:cNvSpPr>
             <a:spLocks noGrp="1"/>
           </p:cNvSpPr>
           <p:nvPr>
-            <p:ph type="body" idx="1"/>
+            <p:ph type="sldNum" idx="12"/>
           </p:nvPr>
         </p:nvSpPr>
-        <p:spPr>
-          <a:xfrm>
-            <a:off x="628650" y="1369219"/>
-            <a:ext cx="7886700" cy="3263400"/>
-          </a:xfrm>
-          <a:prstGeom prst="rect">
-            <a:avLst/>
-          </a:prstGeom>
-          <a:noFill/>
-          <a:ln>
-            <a:noFill/>
-          </a:ln>
-        </p:spPr>
+        <p:spPr/>
         <p:txBody>
-          <a:bodyPr spcFirstLastPara="1" wrap="square" lIns="91425" tIns="45700" rIns="91425" bIns="45700" anchor="t" anchorCtr="0">
-            <a:noAutofit/>
-          </a:bodyPr>
+          <a:bodyPr/>
           <a:lstStyle/>
           <a:p>
-            <a:pPr marL="228600" lvl="0" indent="-50800" algn="l" rtl="0">
-              <a:lnSpc>
-                <a:spcPct val="90000"/>
-              </a:lnSpc>
-              <a:spcBef>
-                <a:spcPts val="0"/>
-              </a:spcBef>
-              <a:spcAft>
-                <a:spcPts val="0"/>
-              </a:spcAft>
-              <a:buClr>
-                <a:srgbClr val="3F3F3F"/>
-              </a:buClr>
-              <a:buSzPts val="2800"/>
+            <a:pPr marL="0" lvl="0" indent="0" algn="r" rtl="0">
+              <a:spcBef>
+                <a:spcPts val="0"/>
+              </a:spcBef>
+              <a:spcAft>
+                <a:spcPts val="0"/>
+              </a:spcAft>
               <a:buNone/>
             </a:pPr>
-            <a:endParaRPr/>
+            <a:fld id="{00000000-1234-1234-1234-123412341234}" type="slidenum">
+              <a:rPr lang="pt-BR" smtClean="0"/>
+              <a:t>9</a:t>
+            </a:fld>
+            <a:endParaRPr lang="pt-BR"/>
           </a:p>
         </p:txBody>
       </p:sp>
     </p:spTree>
+    <p:extLst>
+      <p:ext uri="{BB962C8B-B14F-4D97-AF65-F5344CB8AC3E}">
+        <p14:creationId xmlns:p14="http://schemas.microsoft.com/office/powerpoint/2010/main" val="1844989461"/>
+      </p:ext>
+    </p:extLst>
   </p:cSld>
   <p:clrMapOvr>
     <a:masterClrMapping/>

</xml_diff>